<commit_message>
Artigo | Imagens adicionadas nos slides
</commit_message>
<xml_diff>
--- a/Artigo/Apresentação.pptx
+++ b/Artigo/Apresentação.pptx
@@ -2764,46 +2764,6 @@
       </p:grpSpPr>
       <p:sp>
         <p:nvSpPr>
-          <p:cNvPr id="3" name="Espaço Reservado para Texto 2">
-            <a:extLst>
-              <a:ext uri="{FF2B5EF4-FFF2-40B4-BE49-F238E27FC236}">
-                <a16:creationId xmlns:a16="http://schemas.microsoft.com/office/drawing/2014/main" id="{8AD4E550-9BAE-4CD7-931D-BB945F19520F}"/>
-              </a:ext>
-            </a:extLst>
-          </p:cNvPr>
-          <p:cNvSpPr>
-            <a:spLocks noGrp="1"/>
-          </p:cNvSpPr>
-          <p:nvPr>
-            <p:ph type="body"/>
-          </p:nvPr>
-        </p:nvSpPr>
-        <p:spPr>
-          <a:xfrm>
-            <a:off x="457200" y="1604520"/>
-            <a:ext cx="8229240" cy="3977280"/>
-          </a:xfrm>
-        </p:spPr>
-        <p:txBody>
-          <a:bodyPr/>
-          <a:lstStyle/>
-          <a:p>
-            <a:pPr marL="457200" indent="-457200">
-              <a:lnSpc>
-                <a:spcPct val="150000"/>
-              </a:lnSpc>
-              <a:buFont typeface="Arial" panose="020B0604020202020204" pitchFamily="34" charset="0"/>
-              <a:buChar char="•"/>
-            </a:pPr>
-            <a:r>
-              <a:rPr lang="pt-BR" sz="3200" dirty="0"/>
-              <a:t>Imagem do mapa</a:t>
-            </a:r>
-          </a:p>
-        </p:txBody>
-      </p:sp>
-      <p:sp>
-        <p:nvSpPr>
           <p:cNvPr id="4" name="Título 1">
             <a:extLst>
               <a:ext uri="{FF2B5EF4-FFF2-40B4-BE49-F238E27FC236}">
@@ -2855,6 +2815,50 @@
           </a:p>
         </p:txBody>
       </p:sp>
+      <p:pic>
+        <p:nvPicPr>
+          <p:cNvPr id="7" name="Imagem 6">
+            <a:extLst>
+              <a:ext uri="{FF2B5EF4-FFF2-40B4-BE49-F238E27FC236}">
+                <a16:creationId xmlns:a16="http://schemas.microsoft.com/office/drawing/2014/main" id="{160FEB4E-F94D-4ECC-BC31-8DD61CD2B22D}"/>
+              </a:ext>
+            </a:extLst>
+          </p:cNvPr>
+          <p:cNvPicPr>
+            <a:picLocks noChangeAspect="1"/>
+          </p:cNvPicPr>
+          <p:nvPr/>
+        </p:nvPicPr>
+        <p:blipFill>
+          <a:blip r:embed="rId2">
+            <a:extLst>
+              <a:ext uri="{28A0092B-C50C-407E-A947-70E740481C1C}">
+                <a14:useLocalDpi xmlns:a14="http://schemas.microsoft.com/office/drawing/2010/main" val="0"/>
+              </a:ext>
+            </a:extLst>
+          </a:blip>
+          <a:stretch>
+            <a:fillRect/>
+          </a:stretch>
+        </p:blipFill>
+        <p:spPr>
+          <a:xfrm>
+            <a:off x="291675" y="1447060"/>
+            <a:ext cx="8560649" cy="5273774"/>
+          </a:xfrm>
+          <a:prstGeom prst="rect">
+            <a:avLst/>
+          </a:prstGeom>
+          <a:effectLst>
+            <a:outerShdw blurRad="50800" dist="38100" dir="2700000" algn="tl" rotWithShape="0">
+              <a:prstClr val="black">
+                <a:alpha val="40000"/>
+              </a:prstClr>
+            </a:outerShdw>
+            <a:softEdge rad="12700"/>
+          </a:effectLst>
+        </p:spPr>
+      </p:pic>
     </p:spTree>
     <p:extLst>
       <p:ext uri="{BB962C8B-B14F-4D97-AF65-F5344CB8AC3E}">
@@ -2887,46 +2891,6 @@
       </p:grpSpPr>
       <p:sp>
         <p:nvSpPr>
-          <p:cNvPr id="3" name="Espaço Reservado para Texto 2">
-            <a:extLst>
-              <a:ext uri="{FF2B5EF4-FFF2-40B4-BE49-F238E27FC236}">
-                <a16:creationId xmlns:a16="http://schemas.microsoft.com/office/drawing/2014/main" id="{8AD4E550-9BAE-4CD7-931D-BB945F19520F}"/>
-              </a:ext>
-            </a:extLst>
-          </p:cNvPr>
-          <p:cNvSpPr>
-            <a:spLocks noGrp="1"/>
-          </p:cNvSpPr>
-          <p:nvPr>
-            <p:ph type="body"/>
-          </p:nvPr>
-        </p:nvSpPr>
-        <p:spPr>
-          <a:xfrm>
-            <a:off x="457200" y="1604520"/>
-            <a:ext cx="8229240" cy="3977280"/>
-          </a:xfrm>
-        </p:spPr>
-        <p:txBody>
-          <a:bodyPr/>
-          <a:lstStyle/>
-          <a:p>
-            <a:pPr marL="457200" indent="-457200">
-              <a:lnSpc>
-                <a:spcPct val="150000"/>
-              </a:lnSpc>
-              <a:buFont typeface="Arial" panose="020B0604020202020204" pitchFamily="34" charset="0"/>
-              <a:buChar char="•"/>
-            </a:pPr>
-            <a:r>
-              <a:rPr lang="pt-BR" sz="3200" dirty="0"/>
-              <a:t>Tabelas de resultados</a:t>
-            </a:r>
-          </a:p>
-        </p:txBody>
-      </p:sp>
-      <p:sp>
-        <p:nvSpPr>
           <p:cNvPr id="4" name="Título 1">
             <a:extLst>
               <a:ext uri="{FF2B5EF4-FFF2-40B4-BE49-F238E27FC236}">
@@ -2978,6 +2942,50 @@
           </a:p>
         </p:txBody>
       </p:sp>
+      <p:pic>
+        <p:nvPicPr>
+          <p:cNvPr id="7" name="Imagem 6">
+            <a:extLst>
+              <a:ext uri="{FF2B5EF4-FFF2-40B4-BE49-F238E27FC236}">
+                <a16:creationId xmlns:a16="http://schemas.microsoft.com/office/drawing/2014/main" id="{F43021EB-60AB-442D-8A05-C9F2C5A5AD20}"/>
+              </a:ext>
+            </a:extLst>
+          </p:cNvPr>
+          <p:cNvPicPr>
+            <a:picLocks noChangeAspect="1"/>
+          </p:cNvPicPr>
+          <p:nvPr/>
+        </p:nvPicPr>
+        <p:blipFill>
+          <a:blip r:embed="rId2">
+            <a:extLst>
+              <a:ext uri="{28A0092B-C50C-407E-A947-70E740481C1C}">
+                <a14:useLocalDpi xmlns:a14="http://schemas.microsoft.com/office/drawing/2010/main" val="0"/>
+              </a:ext>
+            </a:extLst>
+          </a:blip>
+          <a:stretch>
+            <a:fillRect/>
+          </a:stretch>
+        </p:blipFill>
+        <p:spPr>
+          <a:xfrm>
+            <a:off x="1441512" y="1276200"/>
+            <a:ext cx="6350630" cy="5453074"/>
+          </a:xfrm>
+          <a:prstGeom prst="rect">
+            <a:avLst/>
+          </a:prstGeom>
+          <a:effectLst>
+            <a:outerShdw blurRad="50800" dist="38100" dir="2700000" algn="tl" rotWithShape="0">
+              <a:prstClr val="black">
+                <a:alpha val="40000"/>
+              </a:prstClr>
+            </a:outerShdw>
+            <a:softEdge rad="12700"/>
+          </a:effectLst>
+        </p:spPr>
+      </p:pic>
     </p:spTree>
     <p:extLst>
       <p:ext uri="{BB962C8B-B14F-4D97-AF65-F5344CB8AC3E}">

</xml_diff>

<commit_message>
Artigo | slides sobre objetivo e metodologia feitos
</commit_message>
<xml_diff>
--- a/Artigo/Apresentação.pptx
+++ b/Artigo/Apresentação.pptx
@@ -2396,13 +2396,78 @@
               <a:buChar char="•"/>
             </a:pPr>
             <a:r>
-              <a:rPr lang="pt-BR" sz="3200" dirty="0"/>
-              <a:t>Falar sobre LPWAN e </a:t>
-            </a:r>
-            <a:r>
-              <a:rPr lang="pt-BR" sz="3200" dirty="0" err="1"/>
-              <a:t>LoRa</a:t>
-            </a:r>
+              <a:rPr lang="pt-BR" sz="3000" dirty="0" smtClean="0"/>
+              <a:t>LPWAN – </a:t>
+            </a:r>
+            <a:r>
+              <a:rPr lang="pt-BR" sz="3000" dirty="0" err="1" smtClean="0"/>
+              <a:t>Low</a:t>
+            </a:r>
+            <a:r>
+              <a:rPr lang="pt-BR" sz="3000" dirty="0" smtClean="0"/>
+              <a:t> Power </a:t>
+            </a:r>
+            <a:r>
+              <a:rPr lang="pt-BR" sz="3000" dirty="0" err="1" smtClean="0"/>
+              <a:t>Wide</a:t>
+            </a:r>
+            <a:r>
+              <a:rPr lang="pt-BR" sz="3000" dirty="0" smtClean="0"/>
+              <a:t> </a:t>
+            </a:r>
+            <a:r>
+              <a:rPr lang="pt-BR" sz="3000" dirty="0" err="1" smtClean="0"/>
+              <a:t>Area</a:t>
+            </a:r>
+            <a:r>
+              <a:rPr lang="pt-BR" sz="3000" dirty="0" smtClean="0"/>
+              <a:t> Networks</a:t>
+            </a:r>
+          </a:p>
+          <a:p>
+            <a:pPr marL="457200" indent="-457200">
+              <a:lnSpc>
+                <a:spcPct val="150000"/>
+              </a:lnSpc>
+              <a:buFont typeface="Arial" panose="020B0604020202020204" pitchFamily="34" charset="0"/>
+              <a:buChar char="•"/>
+            </a:pPr>
+            <a:r>
+              <a:rPr lang="pt-BR" sz="3000" dirty="0" smtClean="0"/>
+              <a:t>Autonomia de bateria, baixo custo, cobertura</a:t>
+            </a:r>
+          </a:p>
+          <a:p>
+            <a:pPr marL="457200" indent="-457200">
+              <a:lnSpc>
+                <a:spcPct val="150000"/>
+              </a:lnSpc>
+              <a:buFont typeface="Arial" panose="020B0604020202020204" pitchFamily="34" charset="0"/>
+              <a:buChar char="•"/>
+            </a:pPr>
+            <a:r>
+              <a:rPr lang="pt-BR" sz="3000" dirty="0" smtClean="0"/>
+              <a:t>Uma estação base e vários nós</a:t>
+            </a:r>
+          </a:p>
+          <a:p>
+            <a:pPr marL="457200" indent="-457200">
+              <a:lnSpc>
+                <a:spcPct val="150000"/>
+              </a:lnSpc>
+              <a:buFont typeface="Arial" panose="020B0604020202020204" pitchFamily="34" charset="0"/>
+              <a:buChar char="•"/>
+            </a:pPr>
+            <a:endParaRPr lang="pt-BR" sz="3000" dirty="0" smtClean="0"/>
+          </a:p>
+          <a:p>
+            <a:pPr marL="457200" indent="-457200">
+              <a:lnSpc>
+                <a:spcPct val="150000"/>
+              </a:lnSpc>
+              <a:buFont typeface="Arial" panose="020B0604020202020204" pitchFamily="34" charset="0"/>
+              <a:buChar char="•"/>
+            </a:pPr>
             <a:endParaRPr lang="pt-BR" sz="3200" dirty="0"/>
           </a:p>
         </p:txBody>
@@ -2508,8 +2573,8 @@
         </p:nvSpPr>
         <p:spPr>
           <a:xfrm>
-            <a:off x="457200" y="1604520"/>
-            <a:ext cx="8229240" cy="3977280"/>
+            <a:off x="79131" y="1641815"/>
+            <a:ext cx="9064869" cy="3708000"/>
           </a:xfrm>
         </p:spPr>
         <p:txBody>
@@ -2524,9 +2589,65 @@
               <a:buChar char="•"/>
             </a:pPr>
             <a:r>
-              <a:rPr lang="pt-BR" sz="3200" dirty="0"/>
-              <a:t>Explicar intuito do experimento</a:t>
-            </a:r>
+              <a:rPr lang="pt-BR" sz="2700" dirty="0" smtClean="0"/>
+              <a:t>Avaliar o alcance utilizando </a:t>
+            </a:r>
+            <a:r>
+              <a:rPr lang="pt-BR" sz="2700" dirty="0" err="1" smtClean="0"/>
+              <a:t>LoRa</a:t>
+            </a:r>
+            <a:r>
+              <a:rPr lang="pt-BR" sz="2700" dirty="0" smtClean="0"/>
+              <a:t> e obter um modelo de atenuação de canal</a:t>
+            </a:r>
+          </a:p>
+          <a:p>
+            <a:pPr marL="457200" indent="-457200">
+              <a:lnSpc>
+                <a:spcPct val="150000"/>
+              </a:lnSpc>
+              <a:buFont typeface="Arial" panose="020B0604020202020204" pitchFamily="34" charset="0"/>
+              <a:buChar char="•"/>
+            </a:pPr>
+            <a:r>
+              <a:rPr lang="pt-BR" sz="2700" dirty="0" smtClean="0"/>
+              <a:t>14 Dias de experimentos na cidade de Oulu, Finlândia</a:t>
+            </a:r>
+          </a:p>
+          <a:p>
+            <a:pPr marL="457200" indent="-457200">
+              <a:lnSpc>
+                <a:spcPct val="150000"/>
+              </a:lnSpc>
+              <a:buFont typeface="Arial" panose="020B0604020202020204" pitchFamily="34" charset="0"/>
+              <a:buChar char="•"/>
+            </a:pPr>
+            <a:r>
+              <a:rPr lang="pt-BR" sz="2700" dirty="0" smtClean="0"/>
+              <a:t>Região no nível do mar com uma cidade</a:t>
+            </a:r>
+          </a:p>
+          <a:p>
+            <a:pPr marL="457200" indent="-457200">
+              <a:lnSpc>
+                <a:spcPct val="150000"/>
+              </a:lnSpc>
+              <a:buFont typeface="Arial" panose="020B0604020202020204" pitchFamily="34" charset="0"/>
+              <a:buChar char="•"/>
+            </a:pPr>
+            <a:r>
+              <a:rPr lang="pt-BR" sz="2700" dirty="0" smtClean="0"/>
+              <a:t>Experimento: Rádio em um veículo e em um barco transmitem para uma </a:t>
+            </a:r>
+            <a:r>
+              <a:rPr lang="pt-BR" sz="2700" dirty="0"/>
+              <a:t>b</a:t>
+            </a:r>
+            <a:r>
+              <a:rPr lang="pt-BR" sz="2700" dirty="0" smtClean="0"/>
+              <a:t>ase na cidade com 24m de altura</a:t>
+            </a:r>
+            <a:endParaRPr lang="pt-BR" sz="2700" dirty="0"/>
           </a:p>
         </p:txBody>
       </p:sp>
@@ -2613,72 +2734,30 @@
           <a:chExt cx="0" cy="0"/>
         </a:xfrm>
       </p:grpSpPr>
-      <p:sp>
-        <p:nvSpPr>
-          <p:cNvPr id="3" name="Espaço Reservado para Texto 2">
-            <a:extLst>
-              <a:ext uri="{FF2B5EF4-FFF2-40B4-BE49-F238E27FC236}">
-                <a16:creationId xmlns:a16="http://schemas.microsoft.com/office/drawing/2014/main" id="{8AD4E550-9BAE-4CD7-931D-BB945F19520F}"/>
-              </a:ext>
-            </a:extLst>
-          </p:cNvPr>
-          <p:cNvSpPr>
-            <a:spLocks noGrp="1"/>
-          </p:cNvSpPr>
-          <p:nvPr>
-            <p:ph type="body"/>
-          </p:nvPr>
-        </p:nvSpPr>
-        <p:spPr>
-          <a:xfrm>
-            <a:off x="457200" y="1604520"/>
-            <a:ext cx="8229240" cy="3977280"/>
-          </a:xfrm>
-        </p:spPr>
-        <p:txBody>
-          <a:bodyPr/>
-          <a:lstStyle/>
-          <a:p>
-            <a:pPr marL="457200" indent="-457200">
-              <a:lnSpc>
-                <a:spcPct val="150000"/>
-              </a:lnSpc>
-              <a:buFont typeface="Arial" panose="020B0604020202020204" pitchFamily="34" charset="0"/>
-              <a:buChar char="•"/>
-            </a:pPr>
-            <a:r>
-              <a:rPr lang="pt-BR" sz="3200" dirty="0"/>
-              <a:t>Como foi feito o experimento</a:t>
-            </a:r>
-          </a:p>
-          <a:p>
-            <a:pPr marL="457200" indent="-457200">
-              <a:lnSpc>
-                <a:spcPct val="150000"/>
-              </a:lnSpc>
-              <a:buFont typeface="Arial" panose="020B0604020202020204" pitchFamily="34" charset="0"/>
-              <a:buChar char="•"/>
-            </a:pPr>
-            <a:r>
-              <a:rPr lang="pt-BR" sz="3200" dirty="0"/>
-              <a:t>Imagens do carro e do barco</a:t>
-            </a:r>
-          </a:p>
-          <a:p>
-            <a:pPr marL="457200" indent="-457200">
-              <a:lnSpc>
-                <a:spcPct val="150000"/>
-              </a:lnSpc>
-              <a:buFont typeface="Arial" panose="020B0604020202020204" pitchFamily="34" charset="0"/>
-              <a:buChar char="•"/>
-            </a:pPr>
-            <a:r>
-              <a:rPr lang="pt-BR" sz="3200" dirty="0"/>
-              <a:t>Base à 24m de altura nível do mar</a:t>
-            </a:r>
-          </a:p>
-        </p:txBody>
-      </p:sp>
+      <p:pic>
+        <p:nvPicPr>
+          <p:cNvPr id="2" name="Imagem 1"/>
+          <p:cNvPicPr>
+            <a:picLocks noChangeAspect="1"/>
+          </p:cNvPicPr>
+          <p:nvPr/>
+        </p:nvPicPr>
+        <p:blipFill>
+          <a:blip r:embed="rId2"/>
+          <a:stretch>
+            <a:fillRect/>
+          </a:stretch>
+        </p:blipFill>
+        <p:spPr>
+          <a:xfrm>
+            <a:off x="4276813" y="1114425"/>
+            <a:ext cx="4429125" cy="2733675"/>
+          </a:xfrm>
+          <a:prstGeom prst="rect">
+            <a:avLst/>
+          </a:prstGeom>
+        </p:spPr>
+      </p:pic>
       <p:sp>
         <p:nvSpPr>
           <p:cNvPr id="4" name="Título 1">
@@ -2729,6 +2808,84 @@
               <a:rPr lang="pt-BR" b="1" dirty="0"/>
               <a:t>Metodologia</a:t>
             </a:r>
+          </a:p>
+        </p:txBody>
+      </p:sp>
+      <p:pic>
+        <p:nvPicPr>
+          <p:cNvPr id="5" name="Imagem 4"/>
+          <p:cNvPicPr>
+            <a:picLocks noChangeAspect="1"/>
+          </p:cNvPicPr>
+          <p:nvPr/>
+        </p:nvPicPr>
+        <p:blipFill>
+          <a:blip r:embed="rId3"/>
+          <a:stretch>
+            <a:fillRect/>
+          </a:stretch>
+        </p:blipFill>
+        <p:spPr>
+          <a:xfrm>
+            <a:off x="503301" y="1114425"/>
+            <a:ext cx="3463200" cy="5286375"/>
+          </a:xfrm>
+          <a:prstGeom prst="rect">
+            <a:avLst/>
+          </a:prstGeom>
+        </p:spPr>
+      </p:pic>
+      <p:sp>
+        <p:nvSpPr>
+          <p:cNvPr id="6" name="CaixaDeTexto 5"/>
+          <p:cNvSpPr txBox="1"/>
+          <p:nvPr/>
+        </p:nvSpPr>
+        <p:spPr>
+          <a:xfrm>
+            <a:off x="4135602" y="4138709"/>
+            <a:ext cx="4711546" cy="1477328"/>
+          </a:xfrm>
+          <a:prstGeom prst="rect">
+            <a:avLst/>
+          </a:prstGeom>
+          <a:noFill/>
+        </p:spPr>
+        <p:txBody>
+          <a:bodyPr wrap="none" rtlCol="0">
+            <a:spAutoFit/>
+          </a:bodyPr>
+          <a:lstStyle/>
+          <a:p>
+            <a:r>
+              <a:rPr lang="pt-BR" dirty="0" smtClean="0"/>
+              <a:t>Bateria de 9V</a:t>
+            </a:r>
+          </a:p>
+          <a:p>
+            <a:r>
+              <a:rPr lang="pt-BR" dirty="0" smtClean="0"/>
+              <a:t>Banda de 125kHz</a:t>
+            </a:r>
+          </a:p>
+          <a:p>
+            <a:r>
+              <a:rPr lang="pt-BR" dirty="0" smtClean="0"/>
+              <a:t>Taxa de dados de 293bps</a:t>
+            </a:r>
+          </a:p>
+          <a:p>
+            <a:r>
+              <a:rPr lang="pt-BR" dirty="0" smtClean="0"/>
+              <a:t>26 transmissões por hora</a:t>
+            </a:r>
+          </a:p>
+          <a:p>
+            <a:r>
+              <a:rPr lang="pt-BR" dirty="0" smtClean="0"/>
+              <a:t>Potência de transmissão de 25mW (14dBm)</a:t>
+            </a:r>
+            <a:endParaRPr lang="pt-BR" dirty="0"/>
           </a:p>
         </p:txBody>
       </p:sp>

</xml_diff>

<commit_message>
Artigo | Apresentação finalizada; Conclusões juntas com os resultados.
</commit_message>
<xml_diff>
--- a/Artigo/Apresentação.pptx
+++ b/Artigo/Apresentação.pptx
@@ -11,7 +11,8 @@
     <p:sldId id="261" r:id="rId5"/>
     <p:sldId id="262" r:id="rId6"/>
     <p:sldId id="263" r:id="rId7"/>
-    <p:sldId id="264" r:id="rId8"/>
+    <p:sldId id="265" r:id="rId8"/>
+    <p:sldId id="264" r:id="rId9"/>
   </p:sldIdLst>
   <p:sldSz cx="9144000" cy="6858000" type="screen4x3"/>
   <p:notesSz cx="7559675" cy="10691813"/>
@@ -2396,31 +2397,31 @@
               <a:buChar char="•"/>
             </a:pPr>
             <a:r>
-              <a:rPr lang="pt-BR" sz="3000" dirty="0" smtClean="0"/>
+              <a:rPr lang="pt-BR" sz="3000" dirty="0"/>
               <a:t>LPWAN – </a:t>
             </a:r>
             <a:r>
-              <a:rPr lang="pt-BR" sz="3000" dirty="0" err="1" smtClean="0"/>
+              <a:rPr lang="pt-BR" sz="3000" dirty="0" err="1"/>
               <a:t>Low</a:t>
             </a:r>
             <a:r>
-              <a:rPr lang="pt-BR" sz="3000" dirty="0" smtClean="0"/>
+              <a:rPr lang="pt-BR" sz="3000" dirty="0"/>
               <a:t> Power </a:t>
             </a:r>
             <a:r>
-              <a:rPr lang="pt-BR" sz="3000" dirty="0" err="1" smtClean="0"/>
+              <a:rPr lang="pt-BR" sz="3000" dirty="0" err="1"/>
               <a:t>Wide</a:t>
             </a:r>
             <a:r>
-              <a:rPr lang="pt-BR" sz="3000" dirty="0" smtClean="0"/>
+              <a:rPr lang="pt-BR" sz="3000" dirty="0"/>
               <a:t> </a:t>
             </a:r>
             <a:r>
-              <a:rPr lang="pt-BR" sz="3000" dirty="0" err="1" smtClean="0"/>
+              <a:rPr lang="pt-BR" sz="3000" dirty="0" err="1"/>
               <a:t>Area</a:t>
             </a:r>
             <a:r>
-              <a:rPr lang="pt-BR" sz="3000" dirty="0" smtClean="0"/>
+              <a:rPr lang="pt-BR" sz="3000" dirty="0"/>
               <a:t> Networks</a:t>
             </a:r>
           </a:p>
@@ -2433,7 +2434,7 @@
               <a:buChar char="•"/>
             </a:pPr>
             <a:r>
-              <a:rPr lang="pt-BR" sz="3000" dirty="0" smtClean="0"/>
+              <a:rPr lang="pt-BR" sz="3000" dirty="0"/>
               <a:t>Autonomia de bateria, baixo custo, cobertura</a:t>
             </a:r>
           </a:p>
@@ -2446,7 +2447,7 @@
               <a:buChar char="•"/>
             </a:pPr>
             <a:r>
-              <a:rPr lang="pt-BR" sz="3000" dirty="0" smtClean="0"/>
+              <a:rPr lang="pt-BR" sz="3000" dirty="0"/>
               <a:t>Uma estação base e vários nós</a:t>
             </a:r>
           </a:p>
@@ -2458,7 +2459,7 @@
               <a:buFont typeface="Arial" panose="020B0604020202020204" pitchFamily="34" charset="0"/>
               <a:buChar char="•"/>
             </a:pPr>
-            <a:endParaRPr lang="pt-BR" sz="3000" dirty="0" smtClean="0"/>
+            <a:endParaRPr lang="pt-BR" sz="3000" dirty="0"/>
           </a:p>
           <a:p>
             <a:pPr marL="457200" indent="-457200">
@@ -2589,15 +2590,15 @@
               <a:buChar char="•"/>
             </a:pPr>
             <a:r>
-              <a:rPr lang="pt-BR" sz="2700" dirty="0" smtClean="0"/>
+              <a:rPr lang="pt-BR" sz="2700" dirty="0"/>
               <a:t>Avaliar o alcance utilizando </a:t>
             </a:r>
             <a:r>
-              <a:rPr lang="pt-BR" sz="2700" dirty="0" err="1" smtClean="0"/>
+              <a:rPr lang="pt-BR" sz="2700" dirty="0" err="1"/>
               <a:t>LoRa</a:t>
             </a:r>
             <a:r>
-              <a:rPr lang="pt-BR" sz="2700" dirty="0" smtClean="0"/>
+              <a:rPr lang="pt-BR" sz="2700" dirty="0"/>
               <a:t> e obter um modelo de atenuação de canal</a:t>
             </a:r>
           </a:p>
@@ -2610,7 +2611,7 @@
               <a:buChar char="•"/>
             </a:pPr>
             <a:r>
-              <a:rPr lang="pt-BR" sz="2700" dirty="0" smtClean="0"/>
+              <a:rPr lang="pt-BR" sz="2700" dirty="0"/>
               <a:t>14 Dias de experimentos na cidade de Oulu, Finlândia</a:t>
             </a:r>
           </a:p>
@@ -2623,7 +2624,7 @@
               <a:buChar char="•"/>
             </a:pPr>
             <a:r>
-              <a:rPr lang="pt-BR" sz="2700" dirty="0" smtClean="0"/>
+              <a:rPr lang="pt-BR" sz="2700" dirty="0"/>
               <a:t>Região no nível do mar com uma cidade</a:t>
             </a:r>
           </a:p>
@@ -2636,18 +2637,9 @@
               <a:buChar char="•"/>
             </a:pPr>
             <a:r>
-              <a:rPr lang="pt-BR" sz="2700" dirty="0" smtClean="0"/>
-              <a:t>Experimento: Rádio em um veículo e em um barco transmitem para uma </a:t>
-            </a:r>
-            <a:r>
               <a:rPr lang="pt-BR" sz="2700" dirty="0"/>
-              <a:t>b</a:t>
-            </a:r>
-            <a:r>
-              <a:rPr lang="pt-BR" sz="2700" dirty="0" smtClean="0"/>
-              <a:t>ase na cidade com 24m de altura</a:t>
-            </a:r>
-            <a:endParaRPr lang="pt-BR" sz="2700" dirty="0"/>
+              <a:t>Experimento: Rádio em um veículo e em um barco transmitem para uma base na cidade com 24m de altura</a:t>
+            </a:r>
           </a:p>
         </p:txBody>
       </p:sp>
@@ -2858,34 +2850,33 @@
           <a:lstStyle/>
           <a:p>
             <a:r>
-              <a:rPr lang="pt-BR" dirty="0" smtClean="0"/>
+              <a:rPr lang="pt-BR" dirty="0"/>
               <a:t>Bateria de 9V</a:t>
             </a:r>
           </a:p>
           <a:p>
             <a:r>
-              <a:rPr lang="pt-BR" dirty="0" smtClean="0"/>
+              <a:rPr lang="pt-BR" dirty="0"/>
               <a:t>Banda de 125kHz</a:t>
             </a:r>
           </a:p>
           <a:p>
             <a:r>
-              <a:rPr lang="pt-BR" dirty="0" smtClean="0"/>
+              <a:rPr lang="pt-BR" dirty="0"/>
               <a:t>Taxa de dados de 293bps</a:t>
             </a:r>
           </a:p>
           <a:p>
             <a:r>
-              <a:rPr lang="pt-BR" dirty="0" smtClean="0"/>
+              <a:rPr lang="pt-BR" dirty="0"/>
               <a:t>26 transmissões por hora</a:t>
             </a:r>
           </a:p>
           <a:p>
             <a:r>
-              <a:rPr lang="pt-BR" dirty="0" smtClean="0"/>
+              <a:rPr lang="pt-BR" dirty="0"/>
               <a:t>Potência de transmissão de 25mW (14dBm)</a:t>
             </a:r>
-            <a:endParaRPr lang="pt-BR" dirty="0"/>
           </a:p>
         </p:txBody>
       </p:sp>
@@ -2935,8 +2926,8 @@
         </p:nvSpPr>
         <p:spPr>
           <a:xfrm>
-            <a:off x="1441512" y="223651"/>
-            <a:ext cx="6260616" cy="1052549"/>
+            <a:off x="1133566" y="250284"/>
+            <a:ext cx="6876865" cy="1052549"/>
           </a:xfrm>
           <a:prstGeom prst="rect">
             <a:avLst/>
@@ -2967,7 +2958,7 @@
             <a:pPr algn="ctr"/>
             <a:r>
               <a:rPr lang="pt-BR" b="1" dirty="0"/>
-              <a:t>Resultados</a:t>
+              <a:t>Resultados e Conclusões</a:t>
             </a:r>
           </a:p>
         </p:txBody>
@@ -3046,59 +3037,6 @@
           <a:chExt cx="0" cy="0"/>
         </a:xfrm>
       </p:grpSpPr>
-      <p:sp>
-        <p:nvSpPr>
-          <p:cNvPr id="4" name="Título 1">
-            <a:extLst>
-              <a:ext uri="{FF2B5EF4-FFF2-40B4-BE49-F238E27FC236}">
-                <a16:creationId xmlns:a16="http://schemas.microsoft.com/office/drawing/2014/main" id="{40C3C61F-2223-4804-96EF-F7975AE17DE1}"/>
-              </a:ext>
-            </a:extLst>
-          </p:cNvPr>
-          <p:cNvSpPr txBox="1">
-            <a:spLocks/>
-          </p:cNvSpPr>
-          <p:nvPr/>
-        </p:nvSpPr>
-        <p:spPr>
-          <a:xfrm>
-            <a:off x="1441512" y="223651"/>
-            <a:ext cx="6260616" cy="1052549"/>
-          </a:xfrm>
-          <a:prstGeom prst="rect">
-            <a:avLst/>
-          </a:prstGeom>
-        </p:spPr>
-        <p:txBody>
-          <a:bodyPr lIns="0" tIns="0" rIns="0" bIns="0" anchor="ctr"/>
-          <a:lstStyle>
-            <a:lvl1pPr algn="l" defTabSz="914400" rtl="0" eaLnBrk="1" latinLnBrk="0" hangingPunct="1">
-              <a:lnSpc>
-                <a:spcPct val="90000"/>
-              </a:lnSpc>
-              <a:spcBef>
-                <a:spcPct val="0"/>
-              </a:spcBef>
-              <a:buNone/>
-              <a:defRPr sz="4400" kern="1200">
-                <a:solidFill>
-                  <a:schemeClr val="tx1"/>
-                </a:solidFill>
-                <a:latin typeface="+mj-lt"/>
-                <a:ea typeface="+mj-ea"/>
-                <a:cs typeface="+mj-cs"/>
-              </a:defRPr>
-            </a:lvl1pPr>
-          </a:lstStyle>
-          <a:p>
-            <a:pPr algn="ctr"/>
-            <a:r>
-              <a:rPr lang="pt-BR" b="1" dirty="0"/>
-              <a:t>Resultados</a:t>
-            </a:r>
-          </a:p>
-        </p:txBody>
-      </p:sp>
       <p:pic>
         <p:nvPicPr>
           <p:cNvPr id="7" name="Imagem 6">
@@ -3143,6 +3081,59 @@
           </a:effectLst>
         </p:spPr>
       </p:pic>
+      <p:sp>
+        <p:nvSpPr>
+          <p:cNvPr id="5" name="Título 1">
+            <a:extLst>
+              <a:ext uri="{FF2B5EF4-FFF2-40B4-BE49-F238E27FC236}">
+                <a16:creationId xmlns:a16="http://schemas.microsoft.com/office/drawing/2014/main" id="{F22E8CED-E541-415A-BA3C-4AB53347C69A}"/>
+              </a:ext>
+            </a:extLst>
+          </p:cNvPr>
+          <p:cNvSpPr txBox="1">
+            <a:spLocks/>
+          </p:cNvSpPr>
+          <p:nvPr/>
+        </p:nvSpPr>
+        <p:spPr>
+          <a:xfrm>
+            <a:off x="1133566" y="250284"/>
+            <a:ext cx="6876865" cy="1052549"/>
+          </a:xfrm>
+          <a:prstGeom prst="rect">
+            <a:avLst/>
+          </a:prstGeom>
+        </p:spPr>
+        <p:txBody>
+          <a:bodyPr lIns="0" tIns="0" rIns="0" bIns="0" anchor="ctr"/>
+          <a:lstStyle>
+            <a:lvl1pPr algn="l" defTabSz="914400" rtl="0" eaLnBrk="1" latinLnBrk="0" hangingPunct="1">
+              <a:lnSpc>
+                <a:spcPct val="90000"/>
+              </a:lnSpc>
+              <a:spcBef>
+                <a:spcPct val="0"/>
+              </a:spcBef>
+              <a:buNone/>
+              <a:defRPr sz="4400" kern="1200">
+                <a:solidFill>
+                  <a:schemeClr val="tx1"/>
+                </a:solidFill>
+                <a:latin typeface="+mj-lt"/>
+                <a:ea typeface="+mj-ea"/>
+                <a:cs typeface="+mj-cs"/>
+              </a:defRPr>
+            </a:lvl1pPr>
+          </a:lstStyle>
+          <a:p>
+            <a:pPr algn="ctr"/>
+            <a:r>
+              <a:rPr lang="pt-BR" b="1" dirty="0"/>
+              <a:t>Resultados e Conclusões</a:t>
+            </a:r>
+          </a:p>
+        </p:txBody>
+      </p:sp>
     </p:spTree>
     <p:extLst>
       <p:ext uri="{BB962C8B-B14F-4D97-AF65-F5344CB8AC3E}">
@@ -3173,106 +3164,164 @@
           <a:chExt cx="0" cy="0"/>
         </a:xfrm>
       </p:grpSpPr>
-      <p:sp>
-        <p:nvSpPr>
-          <p:cNvPr id="3" name="Espaço Reservado para Texto 2">
+      <p:pic>
+        <p:nvPicPr>
+          <p:cNvPr id="2" name="Imagem 1">
             <a:extLst>
               <a:ext uri="{FF2B5EF4-FFF2-40B4-BE49-F238E27FC236}">
-                <a16:creationId xmlns:a16="http://schemas.microsoft.com/office/drawing/2014/main" id="{8AD4E550-9BAE-4CD7-931D-BB945F19520F}"/>
+                <a16:creationId xmlns:a16="http://schemas.microsoft.com/office/drawing/2014/main" id="{7E3F4208-E9EB-449E-8F42-D353C51C59FB}"/>
               </a:ext>
             </a:extLst>
           </p:cNvPr>
-          <p:cNvSpPr>
-            <a:spLocks noGrp="1"/>
-          </p:cNvSpPr>
-          <p:nvPr>
-            <p:ph type="body"/>
-          </p:nvPr>
-        </p:nvSpPr>
-        <p:spPr>
-          <a:xfrm>
-            <a:off x="457200" y="1604520"/>
-            <a:ext cx="8229240" cy="3977280"/>
-          </a:xfrm>
-        </p:spPr>
-        <p:txBody>
-          <a:bodyPr/>
-          <a:lstStyle/>
-          <a:p>
-            <a:pPr marL="457200" indent="-457200">
-              <a:lnSpc>
-                <a:spcPct val="150000"/>
-              </a:lnSpc>
-              <a:buFont typeface="Arial" panose="020B0604020202020204" pitchFamily="34" charset="0"/>
-              <a:buChar char="•"/>
-            </a:pPr>
-            <a:r>
-              <a:rPr lang="pt-BR" sz="3200" dirty="0"/>
-              <a:t>Distancia por </a:t>
-            </a:r>
-            <a:r>
-              <a:rPr lang="pt-BR" sz="3200" dirty="0" err="1"/>
-              <a:t>packet</a:t>
-            </a:r>
-            <a:r>
-              <a:rPr lang="pt-BR" sz="3200" dirty="0"/>
-              <a:t> </a:t>
-            </a:r>
-            <a:r>
-              <a:rPr lang="pt-BR" sz="3200" dirty="0" err="1"/>
-              <a:t>loss</a:t>
-            </a:r>
-            <a:endParaRPr lang="pt-BR" sz="3200" dirty="0"/>
-          </a:p>
-          <a:p>
-            <a:pPr marL="457200" indent="-457200">
-              <a:lnSpc>
-                <a:spcPct val="150000"/>
-              </a:lnSpc>
-              <a:buFont typeface="Arial" panose="020B0604020202020204" pitchFamily="34" charset="0"/>
-              <a:buChar char="•"/>
-            </a:pPr>
-            <a:r>
-              <a:rPr lang="pt-BR" sz="3200" dirty="0"/>
-              <a:t>Modelo de atenuação </a:t>
-            </a:r>
-            <a:r>
-              <a:rPr lang="pt-BR" sz="3200"/>
-              <a:t>de canal para </a:t>
-            </a:r>
-            <a:r>
-              <a:rPr lang="pt-BR" sz="3200" dirty="0"/>
-              <a:t>operadoras</a:t>
-            </a:r>
-          </a:p>
-          <a:p>
-            <a:pPr marL="457200" indent="-457200">
-              <a:lnSpc>
-                <a:spcPct val="150000"/>
-              </a:lnSpc>
-              <a:buFont typeface="Arial" panose="020B0604020202020204" pitchFamily="34" charset="0"/>
-              <a:buChar char="•"/>
-            </a:pPr>
-            <a:endParaRPr lang="pt-BR" sz="3200" dirty="0"/>
-          </a:p>
-          <a:p>
-            <a:pPr marL="457200" indent="-457200">
-              <a:lnSpc>
-                <a:spcPct val="150000"/>
-              </a:lnSpc>
-              <a:buFont typeface="Arial" panose="020B0604020202020204" pitchFamily="34" charset="0"/>
-              <a:buChar char="•"/>
-            </a:pPr>
-            <a:endParaRPr lang="pt-BR" sz="3200" dirty="0"/>
-          </a:p>
-        </p:txBody>
-      </p:sp>
-      <p:sp>
-        <p:nvSpPr>
-          <p:cNvPr id="4" name="Título 1">
+          <p:cNvPicPr>
+            <a:picLocks noChangeAspect="1"/>
+          </p:cNvPicPr>
+          <p:nvPr/>
+        </p:nvPicPr>
+        <p:blipFill>
+          <a:blip r:embed="rId2"/>
+          <a:stretch>
+            <a:fillRect/>
+          </a:stretch>
+        </p:blipFill>
+        <p:spPr>
+          <a:xfrm>
+            <a:off x="803180" y="1351655"/>
+            <a:ext cx="3849764" cy="612462"/>
+          </a:xfrm>
+          <a:prstGeom prst="rect">
+            <a:avLst/>
+          </a:prstGeom>
+          <a:effectLst>
+            <a:outerShdw blurRad="50800" dist="38100" dir="2700000" algn="tl" rotWithShape="0">
+              <a:prstClr val="black">
+                <a:alpha val="40000"/>
+              </a:prstClr>
+            </a:outerShdw>
+            <a:softEdge rad="12700"/>
+          </a:effectLst>
+        </p:spPr>
+      </p:pic>
+      <p:pic>
+        <p:nvPicPr>
+          <p:cNvPr id="3" name="Imagem 2">
             <a:extLst>
               <a:ext uri="{FF2B5EF4-FFF2-40B4-BE49-F238E27FC236}">
-                <a16:creationId xmlns:a16="http://schemas.microsoft.com/office/drawing/2014/main" id="{40C3C61F-2223-4804-96EF-F7975AE17DE1}"/>
+                <a16:creationId xmlns:a16="http://schemas.microsoft.com/office/drawing/2014/main" id="{A3CFC5CC-53F6-47FB-908C-1E4914D885F4}"/>
+              </a:ext>
+            </a:extLst>
+          </p:cNvPr>
+          <p:cNvPicPr>
+            <a:picLocks noChangeAspect="1"/>
+          </p:cNvPicPr>
+          <p:nvPr/>
+        </p:nvPicPr>
+        <p:blipFill>
+          <a:blip r:embed="rId3"/>
+          <a:stretch>
+            <a:fillRect/>
+          </a:stretch>
+        </p:blipFill>
+        <p:spPr>
+          <a:xfrm>
+            <a:off x="4785539" y="1434292"/>
+            <a:ext cx="3130308" cy="447187"/>
+          </a:xfrm>
+          <a:prstGeom prst="rect">
+            <a:avLst/>
+          </a:prstGeom>
+          <a:effectLst>
+            <a:outerShdw blurRad="50800" dist="38100" dir="2700000" algn="tl" rotWithShape="0">
+              <a:prstClr val="black">
+                <a:alpha val="40000"/>
+              </a:prstClr>
+            </a:outerShdw>
+            <a:softEdge rad="12700"/>
+          </a:effectLst>
+        </p:spPr>
+      </p:pic>
+      <p:pic>
+        <p:nvPicPr>
+          <p:cNvPr id="6" name="Imagem 5">
+            <a:extLst>
+              <a:ext uri="{FF2B5EF4-FFF2-40B4-BE49-F238E27FC236}">
+                <a16:creationId xmlns:a16="http://schemas.microsoft.com/office/drawing/2014/main" id="{17C20FCF-BF5C-4709-8791-C17BA7BC15CC}"/>
+              </a:ext>
+            </a:extLst>
+          </p:cNvPr>
+          <p:cNvPicPr>
+            <a:picLocks noChangeAspect="1"/>
+          </p:cNvPicPr>
+          <p:nvPr/>
+        </p:nvPicPr>
+        <p:blipFill>
+          <a:blip r:embed="rId4"/>
+          <a:stretch>
+            <a:fillRect/>
+          </a:stretch>
+        </p:blipFill>
+        <p:spPr>
+          <a:xfrm>
+            <a:off x="4785539" y="2179804"/>
+            <a:ext cx="4170762" cy="3546293"/>
+          </a:xfrm>
+          <a:prstGeom prst="rect">
+            <a:avLst/>
+          </a:prstGeom>
+          <a:effectLst>
+            <a:outerShdw blurRad="50800" dist="38100" dir="2700000" algn="tl" rotWithShape="0">
+              <a:prstClr val="black">
+                <a:alpha val="40000"/>
+              </a:prstClr>
+            </a:outerShdw>
+            <a:softEdge rad="12700"/>
+          </a:effectLst>
+        </p:spPr>
+      </p:pic>
+      <p:pic>
+        <p:nvPicPr>
+          <p:cNvPr id="8" name="Imagem 7">
+            <a:extLst>
+              <a:ext uri="{FF2B5EF4-FFF2-40B4-BE49-F238E27FC236}">
+                <a16:creationId xmlns:a16="http://schemas.microsoft.com/office/drawing/2014/main" id="{33022C3E-DC81-491E-B12C-9077C1FB6BC7}"/>
+              </a:ext>
+            </a:extLst>
+          </p:cNvPr>
+          <p:cNvPicPr>
+            <a:picLocks noChangeAspect="1"/>
+          </p:cNvPicPr>
+          <p:nvPr/>
+        </p:nvPicPr>
+        <p:blipFill>
+          <a:blip r:embed="rId5"/>
+          <a:stretch>
+            <a:fillRect/>
+          </a:stretch>
+        </p:blipFill>
+        <p:spPr>
+          <a:xfrm>
+            <a:off x="187699" y="2179804"/>
+            <a:ext cx="4465245" cy="3546293"/>
+          </a:xfrm>
+          <a:prstGeom prst="rect">
+            <a:avLst/>
+          </a:prstGeom>
+          <a:effectLst>
+            <a:outerShdw blurRad="50800" dist="38100" dir="2700000" algn="tl" rotWithShape="0">
+              <a:prstClr val="black">
+                <a:alpha val="40000"/>
+              </a:prstClr>
+            </a:outerShdw>
+            <a:softEdge rad="12700"/>
+          </a:effectLst>
+        </p:spPr>
+      </p:pic>
+      <p:sp>
+        <p:nvSpPr>
+          <p:cNvPr id="9" name="Título 1">
+            <a:extLst>
+              <a:ext uri="{FF2B5EF4-FFF2-40B4-BE49-F238E27FC236}">
+                <a16:creationId xmlns:a16="http://schemas.microsoft.com/office/drawing/2014/main" id="{6FD9AABA-171A-40C7-A7E6-D47EF0F7C96C}"/>
               </a:ext>
             </a:extLst>
           </p:cNvPr>
@@ -3283,8 +3332,8 @@
         </p:nvSpPr>
         <p:spPr>
           <a:xfrm>
-            <a:off x="1441512" y="223651"/>
-            <a:ext cx="6260616" cy="1052549"/>
+            <a:off x="1133566" y="250284"/>
+            <a:ext cx="6876865" cy="1052549"/>
           </a:xfrm>
           <a:prstGeom prst="rect">
             <a:avLst/>
@@ -3315,11 +3364,179 @@
             <a:pPr algn="ctr"/>
             <a:r>
               <a:rPr lang="pt-BR" b="1" dirty="0"/>
-              <a:t>Conclusões</a:t>
-            </a:r>
-          </a:p>
-        </p:txBody>
-      </p:sp>
+              <a:t>Resultados e Conclusões</a:t>
+            </a:r>
+          </a:p>
+        </p:txBody>
+      </p:sp>
+    </p:spTree>
+    <p:extLst>
+      <p:ext uri="{BB962C8B-B14F-4D97-AF65-F5344CB8AC3E}">
+        <p14:creationId xmlns:p14="http://schemas.microsoft.com/office/powerpoint/2010/main" val="1242888399"/>
+      </p:ext>
+    </p:extLst>
+  </p:cSld>
+  <p:clrMapOvr>
+    <a:masterClrMapping/>
+  </p:clrMapOvr>
+</p:sld>
+</file>
+
+<file path=ppt/slides/slide8.xml><?xml version="1.0" encoding="utf-8"?>
+<p:sld xmlns:a="http://schemas.openxmlformats.org/drawingml/2006/main" xmlns:r="http://schemas.openxmlformats.org/officeDocument/2006/relationships" xmlns:p="http://schemas.openxmlformats.org/presentationml/2006/main">
+  <p:cSld>
+    <p:spTree>
+      <p:nvGrpSpPr>
+        <p:cNvPr id="1" name=""/>
+        <p:cNvGrpSpPr/>
+        <p:nvPr/>
+      </p:nvGrpSpPr>
+      <p:grpSpPr>
+        <a:xfrm>
+          <a:off x="0" y="0"/>
+          <a:ext cx="0" cy="0"/>
+          <a:chOff x="0" y="0"/>
+          <a:chExt cx="0" cy="0"/>
+        </a:xfrm>
+      </p:grpSpPr>
+      <p:sp>
+        <p:nvSpPr>
+          <p:cNvPr id="3" name="Espaço Reservado para Texto 2">
+            <a:extLst>
+              <a:ext uri="{FF2B5EF4-FFF2-40B4-BE49-F238E27FC236}">
+                <a16:creationId xmlns:a16="http://schemas.microsoft.com/office/drawing/2014/main" id="{8AD4E550-9BAE-4CD7-931D-BB945F19520F}"/>
+              </a:ext>
+            </a:extLst>
+          </p:cNvPr>
+          <p:cNvSpPr>
+            <a:spLocks noGrp="1"/>
+          </p:cNvSpPr>
+          <p:nvPr>
+            <p:ph type="body"/>
+          </p:nvPr>
+        </p:nvSpPr>
+        <p:spPr>
+          <a:xfrm>
+            <a:off x="457200" y="1604520"/>
+            <a:ext cx="8229240" cy="3977280"/>
+          </a:xfrm>
+        </p:spPr>
+        <p:txBody>
+          <a:bodyPr/>
+          <a:lstStyle/>
+          <a:p>
+            <a:pPr marL="457200" indent="-457200">
+              <a:lnSpc>
+                <a:spcPct val="150000"/>
+              </a:lnSpc>
+              <a:buFont typeface="Arial" panose="020B0604020202020204" pitchFamily="34" charset="0"/>
+              <a:buChar char="•"/>
+            </a:pPr>
+            <a:endParaRPr lang="pt-BR" sz="3200" dirty="0"/>
+          </a:p>
+          <a:p>
+            <a:pPr marL="457200" indent="-457200">
+              <a:lnSpc>
+                <a:spcPct val="150000"/>
+              </a:lnSpc>
+              <a:buFont typeface="Arial" panose="020B0604020202020204" pitchFamily="34" charset="0"/>
+              <a:buChar char="•"/>
+            </a:pPr>
+            <a:endParaRPr lang="pt-BR" sz="3200" dirty="0"/>
+          </a:p>
+        </p:txBody>
+      </p:sp>
+      <p:sp>
+        <p:nvSpPr>
+          <p:cNvPr id="5" name="Título 1">
+            <a:extLst>
+              <a:ext uri="{FF2B5EF4-FFF2-40B4-BE49-F238E27FC236}">
+                <a16:creationId xmlns:a16="http://schemas.microsoft.com/office/drawing/2014/main" id="{0F514C81-1445-4A25-8AC6-C9C544279C14}"/>
+              </a:ext>
+            </a:extLst>
+          </p:cNvPr>
+          <p:cNvSpPr txBox="1">
+            <a:spLocks/>
+          </p:cNvSpPr>
+          <p:nvPr/>
+        </p:nvSpPr>
+        <p:spPr>
+          <a:xfrm>
+            <a:off x="1133566" y="250284"/>
+            <a:ext cx="6876865" cy="1052549"/>
+          </a:xfrm>
+          <a:prstGeom prst="rect">
+            <a:avLst/>
+          </a:prstGeom>
+        </p:spPr>
+        <p:txBody>
+          <a:bodyPr lIns="0" tIns="0" rIns="0" bIns="0" anchor="ctr"/>
+          <a:lstStyle>
+            <a:lvl1pPr algn="l" defTabSz="914400" rtl="0" eaLnBrk="1" latinLnBrk="0" hangingPunct="1">
+              <a:lnSpc>
+                <a:spcPct val="90000"/>
+              </a:lnSpc>
+              <a:spcBef>
+                <a:spcPct val="0"/>
+              </a:spcBef>
+              <a:buNone/>
+              <a:defRPr sz="4400" kern="1200">
+                <a:solidFill>
+                  <a:schemeClr val="tx1"/>
+                </a:solidFill>
+                <a:latin typeface="+mj-lt"/>
+                <a:ea typeface="+mj-ea"/>
+                <a:cs typeface="+mj-cs"/>
+              </a:defRPr>
+            </a:lvl1pPr>
+          </a:lstStyle>
+          <a:p>
+            <a:pPr algn="ctr"/>
+            <a:r>
+              <a:rPr lang="pt-BR" b="1" dirty="0"/>
+              <a:t>Resultados e Conclusões</a:t>
+            </a:r>
+          </a:p>
+        </p:txBody>
+      </p:sp>
+      <p:pic>
+        <p:nvPicPr>
+          <p:cNvPr id="2" name="Imagem 1">
+            <a:extLst>
+              <a:ext uri="{FF2B5EF4-FFF2-40B4-BE49-F238E27FC236}">
+                <a16:creationId xmlns:a16="http://schemas.microsoft.com/office/drawing/2014/main" id="{25D79F33-3980-4167-9362-AC2729EFB3A2}"/>
+              </a:ext>
+            </a:extLst>
+          </p:cNvPr>
+          <p:cNvPicPr>
+            <a:picLocks noChangeAspect="1"/>
+          </p:cNvPicPr>
+          <p:nvPr/>
+        </p:nvPicPr>
+        <p:blipFill>
+          <a:blip r:embed="rId2"/>
+          <a:stretch>
+            <a:fillRect/>
+          </a:stretch>
+        </p:blipFill>
+        <p:spPr>
+          <a:xfrm>
+            <a:off x="1219168" y="2001267"/>
+            <a:ext cx="6705664" cy="2855466"/>
+          </a:xfrm>
+          <a:prstGeom prst="rect">
+            <a:avLst/>
+          </a:prstGeom>
+          <a:effectLst>
+            <a:outerShdw blurRad="50800" dist="38100" dir="2700000" algn="tl" rotWithShape="0">
+              <a:prstClr val="black">
+                <a:alpha val="40000"/>
+              </a:prstClr>
+            </a:outerShdw>
+            <a:softEdge rad="12700"/>
+          </a:effectLst>
+        </p:spPr>
+      </p:pic>
     </p:spTree>
     <p:extLst>
       <p:ext uri="{BB962C8B-B14F-4D97-AF65-F5344CB8AC3E}">

</xml_diff>